<commit_message>
Functioning Code, Saving then running
</commit_message>
<xml_diff>
--- a/IDing Directed Cycle.pptx
+++ b/IDing Directed Cycle.pptx
@@ -104,6 +104,11 @@
       </a:defRPr>
     </a:lvl9pPr>
   </p:defaultTextStyle>
+  <p:extLst>
+    <p:ext uri="{EFAFB233-063F-42B5-8137-9DF3F51BA10A}">
+      <p15:sldGuideLst xmlns:p15="http://schemas.microsoft.com/office/powerpoint/2012/main"/>
+    </p:ext>
+  </p:extLst>
 </p:presentation>
 </file>
 
@@ -254,7 +259,7 @@
           <a:p>
             <a:fld id="{526299C1-3BEC-421B-BEE6-01BD3CB28D1D}" type="datetimeFigureOut">
               <a:rPr lang="en-US" smtClean="0"/>
-              <a:t>11/17/2020</a:t>
+              <a:t>11/18/2020</a:t>
             </a:fld>
             <a:endParaRPr lang="en-US"/>
           </a:p>
@@ -452,7 +457,7 @@
           <a:p>
             <a:fld id="{526299C1-3BEC-421B-BEE6-01BD3CB28D1D}" type="datetimeFigureOut">
               <a:rPr lang="en-US" smtClean="0"/>
-              <a:t>11/17/2020</a:t>
+              <a:t>11/18/2020</a:t>
             </a:fld>
             <a:endParaRPr lang="en-US"/>
           </a:p>
@@ -660,7 +665,7 @@
           <a:p>
             <a:fld id="{526299C1-3BEC-421B-BEE6-01BD3CB28D1D}" type="datetimeFigureOut">
               <a:rPr lang="en-US" smtClean="0"/>
-              <a:t>11/17/2020</a:t>
+              <a:t>11/18/2020</a:t>
             </a:fld>
             <a:endParaRPr lang="en-US"/>
           </a:p>
@@ -858,7 +863,7 @@
           <a:p>
             <a:fld id="{526299C1-3BEC-421B-BEE6-01BD3CB28D1D}" type="datetimeFigureOut">
               <a:rPr lang="en-US" smtClean="0"/>
-              <a:t>11/17/2020</a:t>
+              <a:t>11/18/2020</a:t>
             </a:fld>
             <a:endParaRPr lang="en-US"/>
           </a:p>
@@ -1133,7 +1138,7 @@
           <a:p>
             <a:fld id="{526299C1-3BEC-421B-BEE6-01BD3CB28D1D}" type="datetimeFigureOut">
               <a:rPr lang="en-US" smtClean="0"/>
-              <a:t>11/17/2020</a:t>
+              <a:t>11/18/2020</a:t>
             </a:fld>
             <a:endParaRPr lang="en-US"/>
           </a:p>
@@ -1398,7 +1403,7 @@
           <a:p>
             <a:fld id="{526299C1-3BEC-421B-BEE6-01BD3CB28D1D}" type="datetimeFigureOut">
               <a:rPr lang="en-US" smtClean="0"/>
-              <a:t>11/17/2020</a:t>
+              <a:t>11/18/2020</a:t>
             </a:fld>
             <a:endParaRPr lang="en-US"/>
           </a:p>
@@ -1810,7 +1815,7 @@
           <a:p>
             <a:fld id="{526299C1-3BEC-421B-BEE6-01BD3CB28D1D}" type="datetimeFigureOut">
               <a:rPr lang="en-US" smtClean="0"/>
-              <a:t>11/17/2020</a:t>
+              <a:t>11/18/2020</a:t>
             </a:fld>
             <a:endParaRPr lang="en-US"/>
           </a:p>
@@ -1951,7 +1956,7 @@
           <a:p>
             <a:fld id="{526299C1-3BEC-421B-BEE6-01BD3CB28D1D}" type="datetimeFigureOut">
               <a:rPr lang="en-US" smtClean="0"/>
-              <a:t>11/17/2020</a:t>
+              <a:t>11/18/2020</a:t>
             </a:fld>
             <a:endParaRPr lang="en-US"/>
           </a:p>
@@ -2064,7 +2069,7 @@
           <a:p>
             <a:fld id="{526299C1-3BEC-421B-BEE6-01BD3CB28D1D}" type="datetimeFigureOut">
               <a:rPr lang="en-US" smtClean="0"/>
-              <a:t>11/17/2020</a:t>
+              <a:t>11/18/2020</a:t>
             </a:fld>
             <a:endParaRPr lang="en-US"/>
           </a:p>
@@ -2375,7 +2380,7 @@
           <a:p>
             <a:fld id="{526299C1-3BEC-421B-BEE6-01BD3CB28D1D}" type="datetimeFigureOut">
               <a:rPr lang="en-US" smtClean="0"/>
-              <a:t>11/17/2020</a:t>
+              <a:t>11/18/2020</a:t>
             </a:fld>
             <a:endParaRPr lang="en-US"/>
           </a:p>
@@ -2663,7 +2668,7 @@
           <a:p>
             <a:fld id="{526299C1-3BEC-421B-BEE6-01BD3CB28D1D}" type="datetimeFigureOut">
               <a:rPr lang="en-US" smtClean="0"/>
-              <a:t>11/17/2020</a:t>
+              <a:t>11/18/2020</a:t>
             </a:fld>
             <a:endParaRPr lang="en-US"/>
           </a:p>
@@ -2904,7 +2909,7 @@
           <a:p>
             <a:fld id="{526299C1-3BEC-421B-BEE6-01BD3CB28D1D}" type="datetimeFigureOut">
               <a:rPr lang="en-US" smtClean="0"/>
-              <a:t>11/17/2020</a:t>
+              <a:t>11/18/2020</a:t>
             </a:fld>
             <a:endParaRPr lang="en-US"/>
           </a:p>
@@ -3339,8 +3344,8 @@
         </p:nvCxnSpPr>
         <p:spPr>
           <a:xfrm flipH="1">
-            <a:off x="4543127" y="3354234"/>
-            <a:ext cx="4306975" cy="1156380"/>
+            <a:off x="6923862" y="3354234"/>
+            <a:ext cx="1926240" cy="848693"/>
           </a:xfrm>
           <a:prstGeom prst="straightConnector1">
             <a:avLst/>
@@ -3382,8 +3387,8 @@
         </p:nvCxnSpPr>
         <p:spPr>
           <a:xfrm flipH="1" flipV="1">
-            <a:off x="5154628" y="2196389"/>
-            <a:ext cx="2035341" cy="2341681"/>
+            <a:off x="6890640" y="2153310"/>
+            <a:ext cx="2680064" cy="2077073"/>
           </a:xfrm>
           <a:prstGeom prst="straightConnector1">
             <a:avLst/>
@@ -3425,7 +3430,7 @@
         </p:nvCxnSpPr>
         <p:spPr>
           <a:xfrm>
-            <a:off x="5154628" y="1509988"/>
+            <a:off x="6890640" y="1466909"/>
             <a:ext cx="0" cy="409402"/>
           </a:xfrm>
           <a:prstGeom prst="straightConnector1">
@@ -3464,7 +3469,7 @@
         </p:nvGrpSpPr>
         <p:grpSpPr>
           <a:xfrm>
-            <a:off x="3304855" y="1919390"/>
+            <a:off x="5040867" y="1876311"/>
             <a:ext cx="2466364" cy="276999"/>
             <a:chOff x="2800877" y="2176955"/>
             <a:chExt cx="2466364" cy="276999"/>
@@ -3550,6 +3555,10 @@
                 <a:rPr lang="en-US" sz="1200" dirty="0" err="1"/>
                 <a:t>n.surv.A</a:t>
               </a:r>
+              <a:r>
+                <a:rPr lang="en-US" sz="1200"/>
+                <a:t>[t]</a:t>
+              </a:r>
               <a:endParaRPr lang="en-US" sz="1200" dirty="0"/>
             </a:p>
           </p:txBody>
@@ -3573,8 +3582,8 @@
         </p:nvCxnSpPr>
         <p:spPr>
           <a:xfrm flipH="1" flipV="1">
-            <a:off x="1092933" y="1509987"/>
-            <a:ext cx="2828513" cy="409403"/>
+            <a:off x="2828945" y="1458519"/>
+            <a:ext cx="2828513" cy="417792"/>
           </a:xfrm>
           <a:prstGeom prst="straightConnector1">
             <a:avLst/>
@@ -3616,8 +3625,8 @@
         </p:nvCxnSpPr>
         <p:spPr>
           <a:xfrm flipH="1" flipV="1">
-            <a:off x="1092933" y="1509987"/>
-            <a:ext cx="4061695" cy="409403"/>
+            <a:off x="2828945" y="1458519"/>
+            <a:ext cx="4061695" cy="417792"/>
           </a:xfrm>
           <a:prstGeom prst="straightConnector1">
             <a:avLst/>
@@ -3655,7 +3664,7 @@
         </p:nvGrpSpPr>
         <p:grpSpPr>
           <a:xfrm>
-            <a:off x="4650650" y="150525"/>
+            <a:off x="7146665" y="149375"/>
             <a:ext cx="2466364" cy="277409"/>
             <a:chOff x="6614442" y="282581"/>
             <a:chExt cx="2466364" cy="277409"/>
@@ -3770,8 +3779,8 @@
         </p:nvCxnSpPr>
         <p:spPr>
           <a:xfrm flipV="1">
-            <a:off x="3899426" y="427524"/>
-            <a:ext cx="1367815" cy="805466"/>
+            <a:off x="5635438" y="426374"/>
+            <a:ext cx="2127818" cy="763537"/>
           </a:xfrm>
           <a:prstGeom prst="straightConnector1">
             <a:avLst/>
@@ -3916,8 +3925,8 @@
         </p:nvCxnSpPr>
         <p:spPr>
           <a:xfrm flipH="1" flipV="1">
-            <a:off x="6500423" y="427934"/>
-            <a:ext cx="3667880" cy="2650960"/>
+            <a:off x="8996438" y="426784"/>
+            <a:ext cx="1171865" cy="2652110"/>
           </a:xfrm>
           <a:prstGeom prst="straightConnector1">
             <a:avLst/>
@@ -3955,7 +3964,7 @@
         </p:nvGrpSpPr>
         <p:grpSpPr>
           <a:xfrm>
-            <a:off x="3260815" y="1232989"/>
+            <a:off x="4996827" y="1189910"/>
             <a:ext cx="2510404" cy="277000"/>
             <a:chOff x="2569221" y="804833"/>
             <a:chExt cx="2510404" cy="277000"/>
@@ -4061,8 +4070,8 @@
         </p:nvCxnSpPr>
         <p:spPr>
           <a:xfrm flipV="1">
-            <a:off x="5154628" y="427934"/>
-            <a:ext cx="1345795" cy="805055"/>
+            <a:off x="6890640" y="426784"/>
+            <a:ext cx="2105798" cy="763126"/>
           </a:xfrm>
           <a:prstGeom prst="straightConnector1">
             <a:avLst/>
@@ -4104,8 +4113,8 @@
         </p:nvCxnSpPr>
         <p:spPr>
           <a:xfrm flipH="1" flipV="1">
-            <a:off x="5267241" y="427524"/>
-            <a:ext cx="3582861" cy="2649711"/>
+            <a:off x="7763256" y="426374"/>
+            <a:ext cx="1086846" cy="2650861"/>
           </a:xfrm>
           <a:prstGeom prst="straightConnector1">
             <a:avLst/>
@@ -4143,7 +4152,7 @@
         </p:nvSpPr>
         <p:spPr>
           <a:xfrm>
-            <a:off x="981039" y="2683876"/>
+            <a:off x="2717051" y="2640797"/>
             <a:ext cx="1233182" cy="276999"/>
           </a:xfrm>
           <a:prstGeom prst="rect">
@@ -4184,7 +4193,7 @@
         </p:nvSpPr>
         <p:spPr>
           <a:xfrm>
-            <a:off x="981039" y="2096610"/>
+            <a:off x="2717051" y="2053531"/>
             <a:ext cx="1233182" cy="276999"/>
           </a:xfrm>
           <a:prstGeom prst="rect">
@@ -4206,7 +4215,7 @@
             <a:pPr algn="ctr"/>
             <a:r>
               <a:rPr lang="en-US" sz="1200" dirty="0"/>
-              <a:t>mean1</a:t>
+              <a:t>Mean1[t]</a:t>
             </a:r>
           </a:p>
         </p:txBody>
@@ -4229,7 +4238,7 @@
         </p:nvCxnSpPr>
         <p:spPr>
           <a:xfrm flipV="1">
-            <a:off x="1597630" y="2373609"/>
+            <a:off x="3333642" y="2330530"/>
             <a:ext cx="0" cy="310267"/>
           </a:xfrm>
           <a:prstGeom prst="straightConnector1">
@@ -4272,7 +4281,7 @@
         </p:nvCxnSpPr>
         <p:spPr>
           <a:xfrm flipH="1">
-            <a:off x="1597630" y="1509989"/>
+            <a:off x="3333642" y="1466910"/>
             <a:ext cx="2301796" cy="586621"/>
           </a:xfrm>
           <a:prstGeom prst="straightConnector1">
@@ -4315,7 +4324,7 @@
         </p:nvCxnSpPr>
         <p:spPr>
           <a:xfrm flipH="1">
-            <a:off x="1597630" y="1509988"/>
+            <a:off x="3333642" y="1466909"/>
             <a:ext cx="3556998" cy="586622"/>
           </a:xfrm>
           <a:prstGeom prst="straightConnector1">
@@ -4354,10 +4363,10 @@
         </p:nvGrpSpPr>
         <p:grpSpPr>
           <a:xfrm>
-            <a:off x="454322" y="1227176"/>
-            <a:ext cx="2509207" cy="282811"/>
-            <a:chOff x="6464184" y="1641811"/>
-            <a:chExt cx="2509207" cy="282811"/>
+            <a:off x="2190334" y="1181520"/>
+            <a:ext cx="2509207" cy="279576"/>
+            <a:chOff x="6464184" y="1639234"/>
+            <a:chExt cx="2509207" cy="279576"/>
           </a:xfrm>
         </p:grpSpPr>
         <p:sp>
@@ -4374,7 +4383,7 @@
           </p:nvSpPr>
           <p:spPr>
             <a:xfrm>
-              <a:off x="6464184" y="1647623"/>
+              <a:off x="6464184" y="1639234"/>
               <a:ext cx="1277222" cy="276999"/>
             </a:xfrm>
             <a:prstGeom prst="rect">
@@ -4461,7 +4470,7 @@
         </p:nvCxnSpPr>
         <p:spPr>
           <a:xfrm flipV="1">
-            <a:off x="1597630" y="1504175"/>
+            <a:off x="3333642" y="1461096"/>
             <a:ext cx="749308" cy="592435"/>
           </a:xfrm>
           <a:prstGeom prst="straightConnector1">
@@ -4504,8 +4513,8 @@
         </p:nvCxnSpPr>
         <p:spPr>
           <a:xfrm flipH="1">
-            <a:off x="7189969" y="3355893"/>
-            <a:ext cx="2978334" cy="1182177"/>
+            <a:off x="9570704" y="3355893"/>
+            <a:ext cx="597599" cy="874490"/>
           </a:xfrm>
           <a:prstGeom prst="straightConnector1">
             <a:avLst/>
@@ -4547,8 +4556,8 @@
         </p:nvCxnSpPr>
         <p:spPr>
           <a:xfrm flipH="1" flipV="1">
-            <a:off x="3921446" y="2196389"/>
-            <a:ext cx="621681" cy="2314225"/>
+            <a:off x="5657458" y="2153310"/>
+            <a:ext cx="1266404" cy="2049617"/>
           </a:xfrm>
           <a:prstGeom prst="straightConnector1">
             <a:avLst/>
@@ -4589,7 +4598,7 @@
         </p:nvCxnSpPr>
         <p:spPr>
           <a:xfrm>
-            <a:off x="3899426" y="1509989"/>
+            <a:off x="5635438" y="1466910"/>
             <a:ext cx="22020" cy="409401"/>
           </a:xfrm>
           <a:prstGeom prst="straightConnector1">
@@ -4628,7 +4637,7 @@
         </p:nvGrpSpPr>
         <p:grpSpPr>
           <a:xfrm>
-            <a:off x="3315192" y="4510614"/>
+            <a:off x="5695927" y="4202927"/>
             <a:ext cx="5049235" cy="2144564"/>
             <a:chOff x="6035247" y="3401544"/>
             <a:chExt cx="5049235" cy="2144564"/>
@@ -6060,6 +6069,1216 @@
           </a:fontRef>
         </p:style>
       </p:cxnSp>
+      <p:grpSp>
+        <p:nvGrpSpPr>
+          <p:cNvPr id="40" name="Group 39">
+            <a:extLst>
+              <a:ext uri="{FF2B5EF4-FFF2-40B4-BE49-F238E27FC236}">
+                <a16:creationId xmlns:a16="http://schemas.microsoft.com/office/drawing/2014/main" id="{AD1D779F-6B47-4046-89FF-5AC19D252820}"/>
+              </a:ext>
+            </a:extLst>
+          </p:cNvPr>
+          <p:cNvGrpSpPr/>
+          <p:nvPr/>
+        </p:nvGrpSpPr>
+        <p:grpSpPr>
+          <a:xfrm>
+            <a:off x="1372773" y="6070492"/>
+            <a:ext cx="5685564" cy="277001"/>
+            <a:chOff x="1372773" y="6070492"/>
+            <a:chExt cx="5685564" cy="277001"/>
+          </a:xfrm>
+        </p:grpSpPr>
+        <p:sp>
+          <p:nvSpPr>
+            <p:cNvPr id="74" name="TextBox 73">
+              <a:extLst>
+                <a:ext uri="{FF2B5EF4-FFF2-40B4-BE49-F238E27FC236}">
+                  <a16:creationId xmlns:a16="http://schemas.microsoft.com/office/drawing/2014/main" id="{0E7E1756-62DE-4464-A9C4-0EAE18248BCE}"/>
+                </a:ext>
+              </a:extLst>
+            </p:cNvPr>
+            <p:cNvSpPr txBox="1"/>
+            <p:nvPr/>
+          </p:nvSpPr>
+          <p:spPr>
+            <a:xfrm>
+              <a:off x="5646448" y="6070494"/>
+              <a:ext cx="1233182" cy="276999"/>
+            </a:xfrm>
+            <a:prstGeom prst="rect">
+              <a:avLst/>
+            </a:prstGeom>
+            <a:noFill/>
+            <a:ln>
+              <a:solidFill>
+                <a:schemeClr val="tx1"/>
+              </a:solidFill>
+            </a:ln>
+          </p:spPr>
+          <p:txBody>
+            <a:bodyPr wrap="square" rtlCol="0">
+              <a:spAutoFit/>
+            </a:bodyPr>
+            <a:lstStyle/>
+            <a:p>
+              <a:pPr algn="ctr"/>
+              <a:r>
+                <a:rPr lang="en-US" sz="1200" dirty="0"/>
+                <a:t>eta</a:t>
+              </a:r>
+            </a:p>
+          </p:txBody>
+        </p:sp>
+        <p:cxnSp>
+          <p:nvCxnSpPr>
+            <p:cNvPr id="3" name="Straight Arrow Connector 2">
+              <a:extLst>
+                <a:ext uri="{FF2B5EF4-FFF2-40B4-BE49-F238E27FC236}">
+                  <a16:creationId xmlns:a16="http://schemas.microsoft.com/office/drawing/2014/main" id="{6128B185-7775-479C-890D-E23800F3C2ED}"/>
+                </a:ext>
+              </a:extLst>
+            </p:cNvPr>
+            <p:cNvCxnSpPr>
+              <a:cxnSpLocks/>
+              <a:stCxn id="275" idx="1"/>
+              <a:endCxn id="74" idx="3"/>
+            </p:cNvCxnSpPr>
+            <p:nvPr/>
+          </p:nvCxnSpPr>
+          <p:spPr>
+            <a:xfrm flipH="1">
+              <a:off x="6879630" y="6208992"/>
+              <a:ext cx="178707" cy="2"/>
+            </a:xfrm>
+            <a:prstGeom prst="straightConnector1">
+              <a:avLst/>
+            </a:prstGeom>
+            <a:ln>
+              <a:tailEnd type="triangle"/>
+            </a:ln>
+          </p:spPr>
+          <p:style>
+            <a:lnRef idx="1">
+              <a:schemeClr val="accent1"/>
+            </a:lnRef>
+            <a:fillRef idx="0">
+              <a:schemeClr val="accent1"/>
+            </a:fillRef>
+            <a:effectRef idx="0">
+              <a:schemeClr val="accent1"/>
+            </a:effectRef>
+            <a:fontRef idx="minor">
+              <a:schemeClr val="tx1"/>
+            </a:fontRef>
+          </p:style>
+        </p:cxnSp>
+        <p:sp>
+          <p:nvSpPr>
+            <p:cNvPr id="78" name="TextBox 77">
+              <a:extLst>
+                <a:ext uri="{FF2B5EF4-FFF2-40B4-BE49-F238E27FC236}">
+                  <a16:creationId xmlns:a16="http://schemas.microsoft.com/office/drawing/2014/main" id="{688FBF18-0D76-4950-8967-AE9F4222B584}"/>
+                </a:ext>
+              </a:extLst>
+            </p:cNvPr>
+            <p:cNvSpPr txBox="1"/>
+            <p:nvPr/>
+          </p:nvSpPr>
+          <p:spPr>
+            <a:xfrm>
+              <a:off x="4221350" y="6070493"/>
+              <a:ext cx="1233182" cy="276999"/>
+            </a:xfrm>
+            <a:prstGeom prst="rect">
+              <a:avLst/>
+            </a:prstGeom>
+            <a:noFill/>
+            <a:ln>
+              <a:solidFill>
+                <a:schemeClr val="tx1"/>
+              </a:solidFill>
+            </a:ln>
+          </p:spPr>
+          <p:txBody>
+            <a:bodyPr wrap="square" rtlCol="0">
+              <a:spAutoFit/>
+            </a:bodyPr>
+            <a:lstStyle/>
+            <a:p>
+              <a:pPr algn="ctr"/>
+              <a:r>
+                <a:rPr lang="en-US" sz="1200" dirty="0"/>
+                <a:t>phi</a:t>
+              </a:r>
+            </a:p>
+          </p:txBody>
+        </p:sp>
+        <p:cxnSp>
+          <p:nvCxnSpPr>
+            <p:cNvPr id="11" name="Straight Arrow Connector 10">
+              <a:extLst>
+                <a:ext uri="{FF2B5EF4-FFF2-40B4-BE49-F238E27FC236}">
+                  <a16:creationId xmlns:a16="http://schemas.microsoft.com/office/drawing/2014/main" id="{D40B2965-8577-481E-A93C-465752FD983F}"/>
+                </a:ext>
+              </a:extLst>
+            </p:cNvPr>
+            <p:cNvCxnSpPr>
+              <a:stCxn id="74" idx="1"/>
+              <a:endCxn id="78" idx="3"/>
+            </p:cNvCxnSpPr>
+            <p:nvPr/>
+          </p:nvCxnSpPr>
+          <p:spPr>
+            <a:xfrm flipH="1" flipV="1">
+              <a:off x="5454532" y="6208993"/>
+              <a:ext cx="191916" cy="1"/>
+            </a:xfrm>
+            <a:prstGeom prst="straightConnector1">
+              <a:avLst/>
+            </a:prstGeom>
+            <a:ln>
+              <a:tailEnd type="triangle"/>
+            </a:ln>
+          </p:spPr>
+          <p:style>
+            <a:lnRef idx="1">
+              <a:schemeClr val="accent1"/>
+            </a:lnRef>
+            <a:fillRef idx="0">
+              <a:schemeClr val="accent1"/>
+            </a:fillRef>
+            <a:effectRef idx="0">
+              <a:schemeClr val="accent1"/>
+            </a:effectRef>
+            <a:fontRef idx="minor">
+              <a:schemeClr val="tx1"/>
+            </a:fontRef>
+          </p:style>
+        </p:cxnSp>
+        <p:sp>
+          <p:nvSpPr>
+            <p:cNvPr id="86" name="TextBox 85">
+              <a:extLst>
+                <a:ext uri="{FF2B5EF4-FFF2-40B4-BE49-F238E27FC236}">
+                  <a16:creationId xmlns:a16="http://schemas.microsoft.com/office/drawing/2014/main" id="{B04EF928-D2ED-4940-8F69-3137F425022F}"/>
+                </a:ext>
+              </a:extLst>
+            </p:cNvPr>
+            <p:cNvSpPr txBox="1"/>
+            <p:nvPr/>
+          </p:nvSpPr>
+          <p:spPr>
+            <a:xfrm>
+              <a:off x="2798690" y="6070492"/>
+              <a:ext cx="1233182" cy="276999"/>
+            </a:xfrm>
+            <a:prstGeom prst="rect">
+              <a:avLst/>
+            </a:prstGeom>
+            <a:noFill/>
+            <a:ln>
+              <a:solidFill>
+                <a:schemeClr val="tx1"/>
+              </a:solidFill>
+            </a:ln>
+          </p:spPr>
+          <p:txBody>
+            <a:bodyPr wrap="square" rtlCol="0">
+              <a:spAutoFit/>
+            </a:bodyPr>
+            <a:lstStyle/>
+            <a:p>
+              <a:pPr algn="ctr"/>
+              <a:r>
+                <a:rPr lang="en-US" sz="1200" dirty="0"/>
+                <a:t>mu</a:t>
+              </a:r>
+            </a:p>
+          </p:txBody>
+        </p:sp>
+        <p:sp>
+          <p:nvSpPr>
+            <p:cNvPr id="87" name="TextBox 86">
+              <a:extLst>
+                <a:ext uri="{FF2B5EF4-FFF2-40B4-BE49-F238E27FC236}">
+                  <a16:creationId xmlns:a16="http://schemas.microsoft.com/office/drawing/2014/main" id="{9A45179E-0F6D-4258-A10A-A2662DB4B2EA}"/>
+                </a:ext>
+              </a:extLst>
+            </p:cNvPr>
+            <p:cNvSpPr txBox="1"/>
+            <p:nvPr/>
+          </p:nvSpPr>
+          <p:spPr>
+            <a:xfrm>
+              <a:off x="1372773" y="6070492"/>
+              <a:ext cx="1233182" cy="276999"/>
+            </a:xfrm>
+            <a:prstGeom prst="rect">
+              <a:avLst/>
+            </a:prstGeom>
+            <a:noFill/>
+            <a:ln>
+              <a:solidFill>
+                <a:schemeClr val="tx1"/>
+              </a:solidFill>
+            </a:ln>
+          </p:spPr>
+          <p:txBody>
+            <a:bodyPr wrap="square" rtlCol="0">
+              <a:spAutoFit/>
+            </a:bodyPr>
+            <a:lstStyle/>
+            <a:p>
+              <a:pPr algn="ctr"/>
+              <a:r>
+                <a:rPr lang="en-US" sz="1200" dirty="0" err="1"/>
+                <a:t>succ</a:t>
+              </a:r>
+              <a:endParaRPr lang="en-US" sz="1200" dirty="0"/>
+            </a:p>
+          </p:txBody>
+        </p:sp>
+        <p:cxnSp>
+          <p:nvCxnSpPr>
+            <p:cNvPr id="23" name="Straight Arrow Connector 22">
+              <a:extLst>
+                <a:ext uri="{FF2B5EF4-FFF2-40B4-BE49-F238E27FC236}">
+                  <a16:creationId xmlns:a16="http://schemas.microsoft.com/office/drawing/2014/main" id="{B41A7FD3-9B67-4A84-9CFB-68E7F0BD09AD}"/>
+                </a:ext>
+              </a:extLst>
+            </p:cNvPr>
+            <p:cNvCxnSpPr>
+              <a:stCxn id="78" idx="1"/>
+              <a:endCxn id="86" idx="3"/>
+            </p:cNvCxnSpPr>
+            <p:nvPr/>
+          </p:nvCxnSpPr>
+          <p:spPr>
+            <a:xfrm flipH="1" flipV="1">
+              <a:off x="4031872" y="6208992"/>
+              <a:ext cx="189478" cy="1"/>
+            </a:xfrm>
+            <a:prstGeom prst="straightConnector1">
+              <a:avLst/>
+            </a:prstGeom>
+            <a:ln>
+              <a:tailEnd type="triangle"/>
+            </a:ln>
+          </p:spPr>
+          <p:style>
+            <a:lnRef idx="1">
+              <a:schemeClr val="accent1"/>
+            </a:lnRef>
+            <a:fillRef idx="0">
+              <a:schemeClr val="accent1"/>
+            </a:fillRef>
+            <a:effectRef idx="0">
+              <a:schemeClr val="accent1"/>
+            </a:effectRef>
+            <a:fontRef idx="minor">
+              <a:schemeClr val="tx1"/>
+            </a:fontRef>
+          </p:style>
+        </p:cxnSp>
+        <p:cxnSp>
+          <p:nvCxnSpPr>
+            <p:cNvPr id="26" name="Straight Arrow Connector 25">
+              <a:extLst>
+                <a:ext uri="{FF2B5EF4-FFF2-40B4-BE49-F238E27FC236}">
+                  <a16:creationId xmlns:a16="http://schemas.microsoft.com/office/drawing/2014/main" id="{19C855D3-680B-43BD-9BE3-6637F5DBB67B}"/>
+                </a:ext>
+              </a:extLst>
+            </p:cNvPr>
+            <p:cNvCxnSpPr>
+              <a:stCxn id="86" idx="1"/>
+              <a:endCxn id="87" idx="3"/>
+            </p:cNvCxnSpPr>
+            <p:nvPr/>
+          </p:nvCxnSpPr>
+          <p:spPr>
+            <a:xfrm flipH="1">
+              <a:off x="2605955" y="6208992"/>
+              <a:ext cx="192735" cy="0"/>
+            </a:xfrm>
+            <a:prstGeom prst="straightConnector1">
+              <a:avLst/>
+            </a:prstGeom>
+            <a:ln>
+              <a:tailEnd type="triangle"/>
+            </a:ln>
+          </p:spPr>
+          <p:style>
+            <a:lnRef idx="1">
+              <a:schemeClr val="accent1"/>
+            </a:lnRef>
+            <a:fillRef idx="0">
+              <a:schemeClr val="accent1"/>
+            </a:fillRef>
+            <a:effectRef idx="0">
+              <a:schemeClr val="accent1"/>
+            </a:effectRef>
+            <a:fontRef idx="minor">
+              <a:schemeClr val="tx1"/>
+            </a:fontRef>
+          </p:style>
+        </p:cxnSp>
+      </p:grpSp>
+      <p:cxnSp>
+        <p:nvCxnSpPr>
+          <p:cNvPr id="28" name="Straight Arrow Connector 27">
+            <a:extLst>
+              <a:ext uri="{FF2B5EF4-FFF2-40B4-BE49-F238E27FC236}">
+                <a16:creationId xmlns:a16="http://schemas.microsoft.com/office/drawing/2014/main" id="{32A2C42E-0D25-468E-9D43-8C31B08A77C3}"/>
+              </a:ext>
+            </a:extLst>
+          </p:cNvPr>
+          <p:cNvCxnSpPr>
+            <a:cxnSpLocks/>
+            <a:stCxn id="275" idx="0"/>
+            <a:endCxn id="92" idx="2"/>
+          </p:cNvCxnSpPr>
+          <p:nvPr/>
+        </p:nvCxnSpPr>
+        <p:spPr>
+          <a:xfrm flipH="1" flipV="1">
+            <a:off x="1076845" y="5236165"/>
+            <a:ext cx="7184836" cy="834327"/>
+          </a:xfrm>
+          <a:prstGeom prst="straightConnector1">
+            <a:avLst/>
+          </a:prstGeom>
+          <a:ln>
+            <a:tailEnd type="triangle"/>
+          </a:ln>
+        </p:spPr>
+        <p:style>
+          <a:lnRef idx="1">
+            <a:schemeClr val="accent1"/>
+          </a:lnRef>
+          <a:fillRef idx="0">
+            <a:schemeClr val="accent1"/>
+          </a:fillRef>
+          <a:effectRef idx="0">
+            <a:schemeClr val="accent1"/>
+          </a:effectRef>
+          <a:fontRef idx="minor">
+            <a:schemeClr val="tx1"/>
+          </a:fontRef>
+        </p:style>
+      </p:cxnSp>
+      <p:cxnSp>
+        <p:nvCxnSpPr>
+          <p:cNvPr id="226" name="Straight Arrow Connector 225">
+            <a:extLst>
+              <a:ext uri="{FF2B5EF4-FFF2-40B4-BE49-F238E27FC236}">
+                <a16:creationId xmlns:a16="http://schemas.microsoft.com/office/drawing/2014/main" id="{ED34BD64-FED0-401F-8634-9CFAFF5D651F}"/>
+              </a:ext>
+            </a:extLst>
+          </p:cNvPr>
+          <p:cNvCxnSpPr>
+            <a:cxnSpLocks/>
+            <a:stCxn id="297" idx="1"/>
+            <a:endCxn id="93" idx="3"/>
+          </p:cNvCxnSpPr>
+          <p:nvPr/>
+        </p:nvCxnSpPr>
+        <p:spPr>
+          <a:xfrm flipH="1">
+            <a:off x="3222546" y="1945317"/>
+            <a:ext cx="4902040" cy="3152349"/>
+          </a:xfrm>
+          <a:prstGeom prst="straightConnector1">
+            <a:avLst/>
+          </a:prstGeom>
+          <a:ln>
+            <a:tailEnd type="triangle"/>
+          </a:ln>
+        </p:spPr>
+        <p:style>
+          <a:lnRef idx="1">
+            <a:schemeClr val="accent1"/>
+          </a:lnRef>
+          <a:fillRef idx="0">
+            <a:schemeClr val="accent1"/>
+          </a:fillRef>
+          <a:effectRef idx="0">
+            <a:schemeClr val="accent1"/>
+          </a:effectRef>
+          <a:fontRef idx="minor">
+            <a:schemeClr val="tx1"/>
+          </a:fontRef>
+        </p:style>
+      </p:cxnSp>
+      <p:grpSp>
+        <p:nvGrpSpPr>
+          <p:cNvPr id="255" name="Group 254">
+            <a:extLst>
+              <a:ext uri="{FF2B5EF4-FFF2-40B4-BE49-F238E27FC236}">
+                <a16:creationId xmlns:a16="http://schemas.microsoft.com/office/drawing/2014/main" id="{F500B2EA-2DF1-4BD8-93B7-BCE1E8065E6A}"/>
+              </a:ext>
+            </a:extLst>
+          </p:cNvPr>
+          <p:cNvGrpSpPr/>
+          <p:nvPr/>
+        </p:nvGrpSpPr>
+        <p:grpSpPr>
+          <a:xfrm>
+            <a:off x="460254" y="3116575"/>
+            <a:ext cx="2765325" cy="2119590"/>
+            <a:chOff x="1669849" y="3128993"/>
+            <a:chExt cx="2765325" cy="2119590"/>
+          </a:xfrm>
+        </p:grpSpPr>
+        <p:sp>
+          <p:nvSpPr>
+            <p:cNvPr id="92" name="TextBox 91">
+              <a:extLst>
+                <a:ext uri="{FF2B5EF4-FFF2-40B4-BE49-F238E27FC236}">
+                  <a16:creationId xmlns:a16="http://schemas.microsoft.com/office/drawing/2014/main" id="{B7F8F789-7E2D-4B60-8A25-03BFD3909868}"/>
+                </a:ext>
+              </a:extLst>
+            </p:cNvPr>
+            <p:cNvSpPr txBox="1"/>
+            <p:nvPr/>
+          </p:nvSpPr>
+          <p:spPr>
+            <a:xfrm>
+              <a:off x="1669849" y="4971584"/>
+              <a:ext cx="1233182" cy="276999"/>
+            </a:xfrm>
+            <a:prstGeom prst="rect">
+              <a:avLst/>
+            </a:prstGeom>
+            <a:noFill/>
+            <a:ln>
+              <a:solidFill>
+                <a:schemeClr val="tx1"/>
+              </a:solidFill>
+            </a:ln>
+          </p:spPr>
+          <p:txBody>
+            <a:bodyPr wrap="square" rtlCol="0">
+              <a:spAutoFit/>
+            </a:bodyPr>
+            <a:lstStyle/>
+            <a:p>
+              <a:pPr algn="ctr"/>
+              <a:r>
+                <a:rPr lang="en-US" sz="1200" dirty="0"/>
+                <a:t>s.br</a:t>
+              </a:r>
+            </a:p>
+          </p:txBody>
+        </p:sp>
+        <p:sp>
+          <p:nvSpPr>
+            <p:cNvPr id="93" name="TextBox 92">
+              <a:extLst>
+                <a:ext uri="{FF2B5EF4-FFF2-40B4-BE49-F238E27FC236}">
+                  <a16:creationId xmlns:a16="http://schemas.microsoft.com/office/drawing/2014/main" id="{F3FDDF4D-B40F-41C5-A88D-DACC3C9B8F68}"/>
+                </a:ext>
+              </a:extLst>
+            </p:cNvPr>
+            <p:cNvSpPr txBox="1"/>
+            <p:nvPr/>
+          </p:nvSpPr>
+          <p:spPr>
+            <a:xfrm>
+              <a:off x="3198959" y="4971584"/>
+              <a:ext cx="1233182" cy="276999"/>
+            </a:xfrm>
+            <a:prstGeom prst="rect">
+              <a:avLst/>
+            </a:prstGeom>
+            <a:noFill/>
+            <a:ln>
+              <a:solidFill>
+                <a:schemeClr val="tx1"/>
+              </a:solidFill>
+            </a:ln>
+          </p:spPr>
+          <p:txBody>
+            <a:bodyPr wrap="square" rtlCol="0">
+              <a:spAutoFit/>
+            </a:bodyPr>
+            <a:lstStyle/>
+            <a:p>
+              <a:pPr algn="ctr"/>
+              <a:r>
+                <a:rPr lang="en-US" sz="1200" dirty="0"/>
+                <a:t>hr.br</a:t>
+              </a:r>
+            </a:p>
+          </p:txBody>
+        </p:sp>
+        <p:sp>
+          <p:nvSpPr>
+            <p:cNvPr id="101" name="TextBox 100">
+              <a:extLst>
+                <a:ext uri="{FF2B5EF4-FFF2-40B4-BE49-F238E27FC236}">
+                  <a16:creationId xmlns:a16="http://schemas.microsoft.com/office/drawing/2014/main" id="{35009E09-F656-416D-9CD2-88962F41F19F}"/>
+                </a:ext>
+              </a:extLst>
+            </p:cNvPr>
+            <p:cNvSpPr txBox="1"/>
+            <p:nvPr/>
+          </p:nvSpPr>
+          <p:spPr>
+            <a:xfrm>
+              <a:off x="1673423" y="4513065"/>
+              <a:ext cx="1233182" cy="276999"/>
+            </a:xfrm>
+            <a:prstGeom prst="rect">
+              <a:avLst/>
+            </a:prstGeom>
+            <a:noFill/>
+            <a:ln>
+              <a:solidFill>
+                <a:schemeClr val="tx1"/>
+              </a:solidFill>
+            </a:ln>
+          </p:spPr>
+          <p:txBody>
+            <a:bodyPr wrap="square" rtlCol="0">
+              <a:spAutoFit/>
+            </a:bodyPr>
+            <a:lstStyle/>
+            <a:p>
+              <a:pPr algn="ctr"/>
+              <a:r>
+                <a:rPr lang="en-US" sz="1200" dirty="0"/>
+                <a:t>s</a:t>
+              </a:r>
+            </a:p>
+          </p:txBody>
+        </p:sp>
+        <p:sp>
+          <p:nvSpPr>
+            <p:cNvPr id="103" name="TextBox 102">
+              <a:extLst>
+                <a:ext uri="{FF2B5EF4-FFF2-40B4-BE49-F238E27FC236}">
+                  <a16:creationId xmlns:a16="http://schemas.microsoft.com/office/drawing/2014/main" id="{6D0E5FBC-76E0-4B85-BA02-B038B68A9EA2}"/>
+                </a:ext>
+              </a:extLst>
+            </p:cNvPr>
+            <p:cNvSpPr txBox="1"/>
+            <p:nvPr/>
+          </p:nvSpPr>
+          <p:spPr>
+            <a:xfrm>
+              <a:off x="3198959" y="4511024"/>
+              <a:ext cx="1233182" cy="276999"/>
+            </a:xfrm>
+            <a:prstGeom prst="rect">
+              <a:avLst/>
+            </a:prstGeom>
+            <a:noFill/>
+            <a:ln>
+              <a:solidFill>
+                <a:schemeClr val="tx1"/>
+              </a:solidFill>
+            </a:ln>
+          </p:spPr>
+          <p:txBody>
+            <a:bodyPr wrap="square" rtlCol="0">
+              <a:spAutoFit/>
+            </a:bodyPr>
+            <a:lstStyle/>
+            <a:p>
+              <a:pPr algn="ctr"/>
+              <a:r>
+                <a:rPr lang="en-US" sz="1200" dirty="0" err="1"/>
+                <a:t>hr</a:t>
+              </a:r>
+              <a:endParaRPr lang="en-US" sz="1200" dirty="0"/>
+            </a:p>
+          </p:txBody>
+        </p:sp>
+        <p:cxnSp>
+          <p:nvCxnSpPr>
+            <p:cNvPr id="230" name="Straight Arrow Connector 229">
+              <a:extLst>
+                <a:ext uri="{FF2B5EF4-FFF2-40B4-BE49-F238E27FC236}">
+                  <a16:creationId xmlns:a16="http://schemas.microsoft.com/office/drawing/2014/main" id="{76594136-D74A-459D-A3B9-0BDB116F7D1F}"/>
+                </a:ext>
+              </a:extLst>
+            </p:cNvPr>
+            <p:cNvCxnSpPr>
+              <a:stCxn id="93" idx="0"/>
+              <a:endCxn id="103" idx="2"/>
+            </p:cNvCxnSpPr>
+            <p:nvPr/>
+          </p:nvCxnSpPr>
+          <p:spPr>
+            <a:xfrm flipV="1">
+              <a:off x="3815550" y="4788023"/>
+              <a:ext cx="0" cy="183561"/>
+            </a:xfrm>
+            <a:prstGeom prst="straightConnector1">
+              <a:avLst/>
+            </a:prstGeom>
+            <a:ln>
+              <a:tailEnd type="triangle"/>
+            </a:ln>
+          </p:spPr>
+          <p:style>
+            <a:lnRef idx="1">
+              <a:schemeClr val="accent1"/>
+            </a:lnRef>
+            <a:fillRef idx="0">
+              <a:schemeClr val="accent1"/>
+            </a:fillRef>
+            <a:effectRef idx="0">
+              <a:schemeClr val="accent1"/>
+            </a:effectRef>
+            <a:fontRef idx="minor">
+              <a:schemeClr val="tx1"/>
+            </a:fontRef>
+          </p:style>
+        </p:cxnSp>
+        <p:cxnSp>
+          <p:nvCxnSpPr>
+            <p:cNvPr id="232" name="Straight Arrow Connector 231">
+              <a:extLst>
+                <a:ext uri="{FF2B5EF4-FFF2-40B4-BE49-F238E27FC236}">
+                  <a16:creationId xmlns:a16="http://schemas.microsoft.com/office/drawing/2014/main" id="{DE8CED01-A2B8-4A33-9EBA-638DE9DE6F9D}"/>
+                </a:ext>
+              </a:extLst>
+            </p:cNvPr>
+            <p:cNvCxnSpPr>
+              <a:stCxn id="92" idx="0"/>
+              <a:endCxn id="101" idx="2"/>
+            </p:cNvCxnSpPr>
+            <p:nvPr/>
+          </p:nvCxnSpPr>
+          <p:spPr>
+            <a:xfrm flipV="1">
+              <a:off x="2286440" y="4790064"/>
+              <a:ext cx="3574" cy="181520"/>
+            </a:xfrm>
+            <a:prstGeom prst="straightConnector1">
+              <a:avLst/>
+            </a:prstGeom>
+            <a:ln>
+              <a:tailEnd type="triangle"/>
+            </a:ln>
+          </p:spPr>
+          <p:style>
+            <a:lnRef idx="1">
+              <a:schemeClr val="accent1"/>
+            </a:lnRef>
+            <a:fillRef idx="0">
+              <a:schemeClr val="accent1"/>
+            </a:fillRef>
+            <a:effectRef idx="0">
+              <a:schemeClr val="accent1"/>
+            </a:effectRef>
+            <a:fontRef idx="minor">
+              <a:schemeClr val="tx1"/>
+            </a:fontRef>
+          </p:style>
+        </p:cxnSp>
+        <p:sp>
+          <p:nvSpPr>
+            <p:cNvPr id="108" name="TextBox 107">
+              <a:extLst>
+                <a:ext uri="{FF2B5EF4-FFF2-40B4-BE49-F238E27FC236}">
+                  <a16:creationId xmlns:a16="http://schemas.microsoft.com/office/drawing/2014/main" id="{8F5F2BB1-032A-4E59-A7AC-31F9FEA7822C}"/>
+                </a:ext>
+              </a:extLst>
+            </p:cNvPr>
+            <p:cNvSpPr txBox="1"/>
+            <p:nvPr/>
+          </p:nvSpPr>
+          <p:spPr>
+            <a:xfrm>
+              <a:off x="1669849" y="4054371"/>
+              <a:ext cx="1233182" cy="276999"/>
+            </a:xfrm>
+            <a:prstGeom prst="rect">
+              <a:avLst/>
+            </a:prstGeom>
+            <a:noFill/>
+            <a:ln>
+              <a:solidFill>
+                <a:schemeClr val="tx1"/>
+              </a:solidFill>
+            </a:ln>
+          </p:spPr>
+          <p:txBody>
+            <a:bodyPr wrap="square" rtlCol="0">
+              <a:spAutoFit/>
+            </a:bodyPr>
+            <a:lstStyle/>
+            <a:p>
+              <a:pPr algn="ctr"/>
+              <a:r>
+                <a:rPr lang="en-US" sz="1200" dirty="0"/>
+                <a:t>mu1</a:t>
+              </a:r>
+            </a:p>
+          </p:txBody>
+        </p:sp>
+        <p:sp>
+          <p:nvSpPr>
+            <p:cNvPr id="110" name="TextBox 109">
+              <a:extLst>
+                <a:ext uri="{FF2B5EF4-FFF2-40B4-BE49-F238E27FC236}">
+                  <a16:creationId xmlns:a16="http://schemas.microsoft.com/office/drawing/2014/main" id="{FCE58473-1831-45CE-83D5-0E21C9D72A0F}"/>
+                </a:ext>
+              </a:extLst>
+            </p:cNvPr>
+            <p:cNvSpPr txBox="1"/>
+            <p:nvPr/>
+          </p:nvSpPr>
+          <p:spPr>
+            <a:xfrm>
+              <a:off x="1670156" y="3593889"/>
+              <a:ext cx="1233182" cy="276999"/>
+            </a:xfrm>
+            <a:prstGeom prst="rect">
+              <a:avLst/>
+            </a:prstGeom>
+            <a:noFill/>
+            <a:ln>
+              <a:solidFill>
+                <a:schemeClr val="tx1"/>
+              </a:solidFill>
+            </a:ln>
+          </p:spPr>
+          <p:txBody>
+            <a:bodyPr wrap="square" rtlCol="0">
+              <a:spAutoFit/>
+            </a:bodyPr>
+            <a:lstStyle/>
+            <a:p>
+              <a:pPr algn="ctr"/>
+              <a:r>
+                <a:rPr lang="en-US" sz="1200" dirty="0"/>
+                <a:t>z</a:t>
+              </a:r>
+            </a:p>
+          </p:txBody>
+        </p:sp>
+        <p:cxnSp>
+          <p:nvCxnSpPr>
+            <p:cNvPr id="235" name="Straight Arrow Connector 234">
+              <a:extLst>
+                <a:ext uri="{FF2B5EF4-FFF2-40B4-BE49-F238E27FC236}">
+                  <a16:creationId xmlns:a16="http://schemas.microsoft.com/office/drawing/2014/main" id="{3E24818C-AE6C-42BA-95AB-A29ED0F69E31}"/>
+                </a:ext>
+              </a:extLst>
+            </p:cNvPr>
+            <p:cNvCxnSpPr>
+              <a:stCxn id="101" idx="0"/>
+              <a:endCxn id="108" idx="2"/>
+            </p:cNvCxnSpPr>
+            <p:nvPr/>
+          </p:nvCxnSpPr>
+          <p:spPr>
+            <a:xfrm flipH="1" flipV="1">
+              <a:off x="2286440" y="4331370"/>
+              <a:ext cx="3574" cy="181695"/>
+            </a:xfrm>
+            <a:prstGeom prst="straightConnector1">
+              <a:avLst/>
+            </a:prstGeom>
+            <a:ln>
+              <a:tailEnd type="triangle"/>
+            </a:ln>
+          </p:spPr>
+          <p:style>
+            <a:lnRef idx="1">
+              <a:schemeClr val="accent1"/>
+            </a:lnRef>
+            <a:fillRef idx="0">
+              <a:schemeClr val="accent1"/>
+            </a:fillRef>
+            <a:effectRef idx="0">
+              <a:schemeClr val="accent1"/>
+            </a:effectRef>
+            <a:fontRef idx="minor">
+              <a:schemeClr val="tx1"/>
+            </a:fontRef>
+          </p:style>
+        </p:cxnSp>
+        <p:cxnSp>
+          <p:nvCxnSpPr>
+            <p:cNvPr id="237" name="Straight Arrow Connector 236">
+              <a:extLst>
+                <a:ext uri="{FF2B5EF4-FFF2-40B4-BE49-F238E27FC236}">
+                  <a16:creationId xmlns:a16="http://schemas.microsoft.com/office/drawing/2014/main" id="{FF9B13C5-331E-4511-A081-072DC1FE3884}"/>
+                </a:ext>
+              </a:extLst>
+            </p:cNvPr>
+            <p:cNvCxnSpPr>
+              <a:stCxn id="108" idx="0"/>
+              <a:endCxn id="110" idx="2"/>
+            </p:cNvCxnSpPr>
+            <p:nvPr/>
+          </p:nvCxnSpPr>
+          <p:spPr>
+            <a:xfrm flipV="1">
+              <a:off x="2286440" y="3870888"/>
+              <a:ext cx="307" cy="183483"/>
+            </a:xfrm>
+            <a:prstGeom prst="straightConnector1">
+              <a:avLst/>
+            </a:prstGeom>
+            <a:ln>
+              <a:tailEnd type="triangle"/>
+            </a:ln>
+          </p:spPr>
+          <p:style>
+            <a:lnRef idx="1">
+              <a:schemeClr val="accent1"/>
+            </a:lnRef>
+            <a:fillRef idx="0">
+              <a:schemeClr val="accent1"/>
+            </a:fillRef>
+            <a:effectRef idx="0">
+              <a:schemeClr val="accent1"/>
+            </a:effectRef>
+            <a:fontRef idx="minor">
+              <a:schemeClr val="tx1"/>
+            </a:fontRef>
+          </p:style>
+        </p:cxnSp>
+        <p:sp>
+          <p:nvSpPr>
+            <p:cNvPr id="113" name="TextBox 112">
+              <a:extLst>
+                <a:ext uri="{FF2B5EF4-FFF2-40B4-BE49-F238E27FC236}">
+                  <a16:creationId xmlns:a16="http://schemas.microsoft.com/office/drawing/2014/main" id="{C2D95E55-09DF-4EC4-9E7D-BB97962266B0}"/>
+                </a:ext>
+              </a:extLst>
+            </p:cNvPr>
+            <p:cNvSpPr txBox="1"/>
+            <p:nvPr/>
+          </p:nvSpPr>
+          <p:spPr>
+            <a:xfrm>
+              <a:off x="3199059" y="4050464"/>
+              <a:ext cx="1233182" cy="276999"/>
+            </a:xfrm>
+            <a:prstGeom prst="rect">
+              <a:avLst/>
+            </a:prstGeom>
+            <a:noFill/>
+            <a:ln>
+              <a:solidFill>
+                <a:schemeClr val="tx1"/>
+              </a:solidFill>
+            </a:ln>
+          </p:spPr>
+          <p:txBody>
+            <a:bodyPr wrap="square" rtlCol="0">
+              <a:spAutoFit/>
+            </a:bodyPr>
+            <a:lstStyle/>
+            <a:p>
+              <a:pPr algn="ctr"/>
+              <a:r>
+                <a:rPr lang="en-US" sz="1200" dirty="0"/>
+                <a:t>mu2</a:t>
+              </a:r>
+            </a:p>
+          </p:txBody>
+        </p:sp>
+        <p:cxnSp>
+          <p:nvCxnSpPr>
+            <p:cNvPr id="239" name="Straight Arrow Connector 238">
+              <a:extLst>
+                <a:ext uri="{FF2B5EF4-FFF2-40B4-BE49-F238E27FC236}">
+                  <a16:creationId xmlns:a16="http://schemas.microsoft.com/office/drawing/2014/main" id="{4EF23424-5EC5-43BB-ABAA-0555739D5865}"/>
+                </a:ext>
+              </a:extLst>
+            </p:cNvPr>
+            <p:cNvCxnSpPr>
+              <a:stCxn id="110" idx="3"/>
+              <a:endCxn id="113" idx="1"/>
+            </p:cNvCxnSpPr>
+            <p:nvPr/>
+          </p:nvCxnSpPr>
+          <p:spPr>
+            <a:xfrm>
+              <a:off x="2903338" y="3732389"/>
+              <a:ext cx="295721" cy="456575"/>
+            </a:xfrm>
+            <a:prstGeom prst="straightConnector1">
+              <a:avLst/>
+            </a:prstGeom>
+            <a:ln>
+              <a:tailEnd type="triangle"/>
+            </a:ln>
+          </p:spPr>
+          <p:style>
+            <a:lnRef idx="1">
+              <a:schemeClr val="accent1"/>
+            </a:lnRef>
+            <a:fillRef idx="0">
+              <a:schemeClr val="accent1"/>
+            </a:fillRef>
+            <a:effectRef idx="0">
+              <a:schemeClr val="accent1"/>
+            </a:effectRef>
+            <a:fontRef idx="minor">
+              <a:schemeClr val="tx1"/>
+            </a:fontRef>
+          </p:style>
+        </p:cxnSp>
+        <p:cxnSp>
+          <p:nvCxnSpPr>
+            <p:cNvPr id="241" name="Straight Arrow Connector 240">
+              <a:extLst>
+                <a:ext uri="{FF2B5EF4-FFF2-40B4-BE49-F238E27FC236}">
+                  <a16:creationId xmlns:a16="http://schemas.microsoft.com/office/drawing/2014/main" id="{C84B7DA1-9DE3-4A06-A369-C815173F24C7}"/>
+                </a:ext>
+              </a:extLst>
+            </p:cNvPr>
+            <p:cNvCxnSpPr>
+              <a:stCxn id="103" idx="0"/>
+              <a:endCxn id="113" idx="2"/>
+            </p:cNvCxnSpPr>
+            <p:nvPr/>
+          </p:nvCxnSpPr>
+          <p:spPr>
+            <a:xfrm flipV="1">
+              <a:off x="3815550" y="4327463"/>
+              <a:ext cx="100" cy="183561"/>
+            </a:xfrm>
+            <a:prstGeom prst="straightConnector1">
+              <a:avLst/>
+            </a:prstGeom>
+            <a:ln>
+              <a:tailEnd type="triangle"/>
+            </a:ln>
+          </p:spPr>
+          <p:style>
+            <a:lnRef idx="1">
+              <a:schemeClr val="accent1"/>
+            </a:lnRef>
+            <a:fillRef idx="0">
+              <a:schemeClr val="accent1"/>
+            </a:fillRef>
+            <a:effectRef idx="0">
+              <a:schemeClr val="accent1"/>
+            </a:effectRef>
+            <a:fontRef idx="minor">
+              <a:schemeClr val="tx1"/>
+            </a:fontRef>
+          </p:style>
+        </p:cxnSp>
+        <p:sp>
+          <p:nvSpPr>
+            <p:cNvPr id="118" name="TextBox 117">
+              <a:extLst>
+                <a:ext uri="{FF2B5EF4-FFF2-40B4-BE49-F238E27FC236}">
+                  <a16:creationId xmlns:a16="http://schemas.microsoft.com/office/drawing/2014/main" id="{647332F8-E57D-4ECB-AE67-2E0F0FBF4204}"/>
+                </a:ext>
+              </a:extLst>
+            </p:cNvPr>
+            <p:cNvSpPr txBox="1"/>
+            <p:nvPr/>
+          </p:nvSpPr>
+          <p:spPr>
+            <a:xfrm>
+              <a:off x="3201992" y="3589983"/>
+              <a:ext cx="1233182" cy="276999"/>
+            </a:xfrm>
+            <a:prstGeom prst="rect">
+              <a:avLst/>
+            </a:prstGeom>
+            <a:noFill/>
+            <a:ln>
+              <a:solidFill>
+                <a:schemeClr val="tx1"/>
+              </a:solidFill>
+            </a:ln>
+          </p:spPr>
+          <p:txBody>
+            <a:bodyPr wrap="square" rtlCol="0">
+              <a:spAutoFit/>
+            </a:bodyPr>
+            <a:lstStyle/>
+            <a:p>
+              <a:pPr algn="ctr"/>
+              <a:r>
+                <a:rPr lang="en-US" sz="1200" dirty="0"/>
+                <a:t>y</a:t>
+              </a:r>
+            </a:p>
+          </p:txBody>
+        </p:sp>
+        <p:cxnSp>
+          <p:nvCxnSpPr>
+            <p:cNvPr id="244" name="Straight Arrow Connector 243">
+              <a:extLst>
+                <a:ext uri="{FF2B5EF4-FFF2-40B4-BE49-F238E27FC236}">
+                  <a16:creationId xmlns:a16="http://schemas.microsoft.com/office/drawing/2014/main" id="{6DBE5B7D-36DA-40FA-A3C2-305609E04F66}"/>
+                </a:ext>
+              </a:extLst>
+            </p:cNvPr>
+            <p:cNvCxnSpPr>
+              <a:stCxn id="113" idx="0"/>
+              <a:endCxn id="118" idx="2"/>
+            </p:cNvCxnSpPr>
+            <p:nvPr/>
+          </p:nvCxnSpPr>
+          <p:spPr>
+            <a:xfrm flipV="1">
+              <a:off x="3815650" y="3866982"/>
+              <a:ext cx="2933" cy="183482"/>
+            </a:xfrm>
+            <a:prstGeom prst="straightConnector1">
+              <a:avLst/>
+            </a:prstGeom>
+            <a:ln>
+              <a:tailEnd type="triangle"/>
+            </a:ln>
+          </p:spPr>
+          <p:style>
+            <a:lnRef idx="1">
+              <a:schemeClr val="accent1"/>
+            </a:lnRef>
+            <a:fillRef idx="0">
+              <a:schemeClr val="accent1"/>
+            </a:fillRef>
+            <a:effectRef idx="0">
+              <a:schemeClr val="accent1"/>
+            </a:effectRef>
+            <a:fontRef idx="minor">
+              <a:schemeClr val="tx1"/>
+            </a:fontRef>
+          </p:style>
+        </p:cxnSp>
+        <p:sp>
+          <p:nvSpPr>
+            <p:cNvPr id="124" name="TextBox 123">
+              <a:extLst>
+                <a:ext uri="{FF2B5EF4-FFF2-40B4-BE49-F238E27FC236}">
+                  <a16:creationId xmlns:a16="http://schemas.microsoft.com/office/drawing/2014/main" id="{405270E8-1949-4C66-8E1F-B556E5199135}"/>
+                </a:ext>
+              </a:extLst>
+            </p:cNvPr>
+            <p:cNvSpPr txBox="1"/>
+            <p:nvPr/>
+          </p:nvSpPr>
+          <p:spPr>
+            <a:xfrm>
+              <a:off x="2434558" y="3128993"/>
+              <a:ext cx="1233182" cy="276999"/>
+            </a:xfrm>
+            <a:prstGeom prst="rect">
+              <a:avLst/>
+            </a:prstGeom>
+            <a:noFill/>
+            <a:ln>
+              <a:solidFill>
+                <a:schemeClr val="tx1"/>
+              </a:solidFill>
+            </a:ln>
+          </p:spPr>
+          <p:txBody>
+            <a:bodyPr wrap="square" rtlCol="0">
+              <a:spAutoFit/>
+            </a:bodyPr>
+            <a:lstStyle/>
+            <a:p>
+              <a:pPr algn="ctr"/>
+              <a:r>
+                <a:rPr lang="en-US" sz="1200" dirty="0"/>
+                <a:t>w</a:t>
+              </a:r>
+            </a:p>
+          </p:txBody>
+        </p:sp>
+        <p:cxnSp>
+          <p:nvCxnSpPr>
+            <p:cNvPr id="251" name="Straight Arrow Connector 250">
+              <a:extLst>
+                <a:ext uri="{FF2B5EF4-FFF2-40B4-BE49-F238E27FC236}">
+                  <a16:creationId xmlns:a16="http://schemas.microsoft.com/office/drawing/2014/main" id="{8C9B2099-B62D-4CD2-B88A-854AC7A067C4}"/>
+                </a:ext>
+              </a:extLst>
+            </p:cNvPr>
+            <p:cNvCxnSpPr>
+              <a:stCxn id="118" idx="0"/>
+              <a:endCxn id="124" idx="2"/>
+            </p:cNvCxnSpPr>
+            <p:nvPr/>
+          </p:nvCxnSpPr>
+          <p:spPr>
+            <a:xfrm flipH="1" flipV="1">
+              <a:off x="3051149" y="3405992"/>
+              <a:ext cx="767434" cy="183991"/>
+            </a:xfrm>
+            <a:prstGeom prst="straightConnector1">
+              <a:avLst/>
+            </a:prstGeom>
+            <a:ln>
+              <a:tailEnd type="triangle"/>
+            </a:ln>
+          </p:spPr>
+          <p:style>
+            <a:lnRef idx="1">
+              <a:schemeClr val="accent1"/>
+            </a:lnRef>
+            <a:fillRef idx="0">
+              <a:schemeClr val="accent1"/>
+            </a:fillRef>
+            <a:effectRef idx="0">
+              <a:schemeClr val="accent1"/>
+            </a:effectRef>
+            <a:fontRef idx="minor">
+              <a:schemeClr val="tx1"/>
+            </a:fontRef>
+          </p:style>
+        </p:cxnSp>
+        <p:cxnSp>
+          <p:nvCxnSpPr>
+            <p:cNvPr id="254" name="Straight Arrow Connector 253">
+              <a:extLst>
+                <a:ext uri="{FF2B5EF4-FFF2-40B4-BE49-F238E27FC236}">
+                  <a16:creationId xmlns:a16="http://schemas.microsoft.com/office/drawing/2014/main" id="{A085C334-BF09-4D5F-8C11-A7DE63239705}"/>
+                </a:ext>
+              </a:extLst>
+            </p:cNvPr>
+            <p:cNvCxnSpPr>
+              <a:stCxn id="110" idx="0"/>
+              <a:endCxn id="124" idx="2"/>
+            </p:cNvCxnSpPr>
+            <p:nvPr/>
+          </p:nvCxnSpPr>
+          <p:spPr>
+            <a:xfrm flipV="1">
+              <a:off x="2286747" y="3405992"/>
+              <a:ext cx="764402" cy="187897"/>
+            </a:xfrm>
+            <a:prstGeom prst="straightConnector1">
+              <a:avLst/>
+            </a:prstGeom>
+            <a:ln>
+              <a:tailEnd type="triangle"/>
+            </a:ln>
+          </p:spPr>
+          <p:style>
+            <a:lnRef idx="1">
+              <a:schemeClr val="accent1"/>
+            </a:lnRef>
+            <a:fillRef idx="0">
+              <a:schemeClr val="accent1"/>
+            </a:fillRef>
+            <a:effectRef idx="0">
+              <a:schemeClr val="accent1"/>
+            </a:effectRef>
+            <a:fontRef idx="minor">
+              <a:schemeClr val="tx1"/>
+            </a:fontRef>
+          </p:style>
+        </p:cxnSp>
+      </p:grpSp>
     </p:spTree>
     <p:extLst>
       <p:ext uri="{BB962C8B-B14F-4D97-AF65-F5344CB8AC3E}">

</xml_diff>